<commit_message>
move F1 to other side
</commit_message>
<xml_diff>
--- a/plots/Fig5 tests.pptx
+++ b/plots/Fig5 tests.pptx
@@ -3660,48 +3660,6 @@
         </p:sp>
         <p:sp>
           <p:nvSpPr>
-            <p:cNvPr id="11" name="TextBox 10">
-              <a:extLst>
-                <a:ext uri="{FF2B5EF4-FFF2-40B4-BE49-F238E27FC236}">
-                  <a16:creationId xmlns:a16="http://schemas.microsoft.com/office/drawing/2014/main" id="{E6A0C051-67BC-C1C9-5194-A72AC07FD00A}"/>
-                </a:ext>
-              </a:extLst>
-            </p:cNvPr>
-            <p:cNvSpPr txBox="1">
-              <a:spLocks/>
-            </p:cNvSpPr>
-            <p:nvPr/>
-          </p:nvSpPr>
-          <p:spPr>
-            <a:xfrm rot="5400000">
-              <a:off x="4550808" y="4842320"/>
-              <a:ext cx="423514" cy="338554"/>
-            </a:xfrm>
-            <a:prstGeom prst="rect">
-              <a:avLst/>
-            </a:prstGeom>
-            <a:noFill/>
-          </p:spPr>
-          <p:txBody>
-            <a:bodyPr wrap="none" rtlCol="0">
-              <a:spAutoFit/>
-            </a:bodyPr>
-            <a:lstStyle/>
-            <a:p>
-              <a:r>
-                <a:rPr lang="en-AU" sz="1600" b="1" dirty="0">
-                  <a:latin typeface="Helvetica" pitchFamily="2" charset="0"/>
-                </a:rPr>
-                <a:t>F1</a:t>
-              </a:r>
-              <a:endParaRPr lang="en-US" sz="1600" b="1" dirty="0">
-                <a:latin typeface="Helvetica" pitchFamily="2" charset="0"/>
-              </a:endParaRPr>
-            </a:p>
-          </p:txBody>
-        </p:sp>
-        <p:sp>
-          <p:nvSpPr>
             <p:cNvPr id="12" name="TextBox 11">
               <a:extLst>
                 <a:ext uri="{FF2B5EF4-FFF2-40B4-BE49-F238E27FC236}">
@@ -3755,13 +3713,13 @@
             <p:nvPr>
               <p:extLst>
                 <p:ext uri="{D42A27DB-BD31-4B8C-83A1-F6EECF244321}">
-                  <p14:modId xmlns:p14="http://schemas.microsoft.com/office/powerpoint/2010/main" val="2383133378"/>
+                  <p14:modId xmlns:p14="http://schemas.microsoft.com/office/powerpoint/2010/main" val="1748139438"/>
                 </p:ext>
               </p:extLst>
             </p:nvPr>
           </p:nvGraphicFramePr>
           <p:xfrm>
-            <a:off x="2610888" y="4126262"/>
+            <a:off x="2708808" y="4186724"/>
             <a:ext cx="1948336" cy="1527841"/>
           </p:xfrm>
           <a:graphic>
@@ -4645,48 +4603,6 @@
             </a:p>
           </p:txBody>
         </p:sp>
-        <p:sp>
-          <p:nvSpPr>
-            <p:cNvPr id="17" name="TextBox 16">
-              <a:extLst>
-                <a:ext uri="{FF2B5EF4-FFF2-40B4-BE49-F238E27FC236}">
-                  <a16:creationId xmlns:a16="http://schemas.microsoft.com/office/drawing/2014/main" id="{BE8392F6-7C70-9AAF-EF90-A474151D3FE0}"/>
-                </a:ext>
-              </a:extLst>
-            </p:cNvPr>
-            <p:cNvSpPr txBox="1">
-              <a:spLocks/>
-            </p:cNvSpPr>
-            <p:nvPr/>
-          </p:nvSpPr>
-          <p:spPr>
-            <a:xfrm rot="5400000">
-              <a:off x="3186987" y="4580046"/>
-              <a:ext cx="423514" cy="338554"/>
-            </a:xfrm>
-            <a:prstGeom prst="rect">
-              <a:avLst/>
-            </a:prstGeom>
-            <a:noFill/>
-          </p:spPr>
-          <p:txBody>
-            <a:bodyPr wrap="none" rtlCol="0">
-              <a:spAutoFit/>
-            </a:bodyPr>
-            <a:lstStyle/>
-            <a:p>
-              <a:r>
-                <a:rPr lang="en-AU" sz="1600" b="1" dirty="0">
-                  <a:latin typeface="Helvetica" pitchFamily="2" charset="0"/>
-                </a:rPr>
-                <a:t>F1</a:t>
-              </a:r>
-              <a:endParaRPr lang="en-US" sz="1600" b="1" dirty="0">
-                <a:latin typeface="Helvetica" pitchFamily="2" charset="0"/>
-              </a:endParaRPr>
-            </a:p>
-          </p:txBody>
-        </p:sp>
         <p:graphicFrame>
           <p:nvGraphicFramePr>
             <p:cNvPr id="18" name="Table 17">
@@ -4702,13 +4618,13 @@
             <p:nvPr>
               <p:extLst>
                 <p:ext uri="{D42A27DB-BD31-4B8C-83A1-F6EECF244321}">
-                  <p14:modId xmlns:p14="http://schemas.microsoft.com/office/powerpoint/2010/main" val="3797790955"/>
+                  <p14:modId xmlns:p14="http://schemas.microsoft.com/office/powerpoint/2010/main" val="3573865659"/>
                 </p:ext>
               </p:extLst>
             </p:nvPr>
           </p:nvGraphicFramePr>
           <p:xfrm>
-            <a:off x="1247067" y="3863988"/>
+            <a:off x="1377238" y="3924445"/>
             <a:ext cx="1948336" cy="1527841"/>
           </p:xfrm>
           <a:graphic>
@@ -5322,48 +5238,6 @@
         </p:sp>
         <p:sp>
           <p:nvSpPr>
-            <p:cNvPr id="26" name="TextBox 25">
-              <a:extLst>
-                <a:ext uri="{FF2B5EF4-FFF2-40B4-BE49-F238E27FC236}">
-                  <a16:creationId xmlns:a16="http://schemas.microsoft.com/office/drawing/2014/main" id="{D14782B8-CC8B-5884-9BD6-9364E736C9CD}"/>
-                </a:ext>
-              </a:extLst>
-            </p:cNvPr>
-            <p:cNvSpPr txBox="1">
-              <a:spLocks/>
-            </p:cNvSpPr>
-            <p:nvPr/>
-          </p:nvSpPr>
-          <p:spPr>
-            <a:xfrm rot="5400000">
-              <a:off x="4550808" y="4842320"/>
-              <a:ext cx="423514" cy="338554"/>
-            </a:xfrm>
-            <a:prstGeom prst="rect">
-              <a:avLst/>
-            </a:prstGeom>
-            <a:noFill/>
-          </p:spPr>
-          <p:txBody>
-            <a:bodyPr wrap="none" rtlCol="0">
-              <a:spAutoFit/>
-            </a:bodyPr>
-            <a:lstStyle/>
-            <a:p>
-              <a:r>
-                <a:rPr lang="en-AU" sz="1600" b="1" dirty="0">
-                  <a:latin typeface="Helvetica" pitchFamily="2" charset="0"/>
-                </a:rPr>
-                <a:t>F1</a:t>
-              </a:r>
-              <a:endParaRPr lang="en-US" sz="1600" b="1" dirty="0">
-                <a:latin typeface="Helvetica" pitchFamily="2" charset="0"/>
-              </a:endParaRPr>
-            </a:p>
-          </p:txBody>
-        </p:sp>
-        <p:sp>
-          <p:nvSpPr>
             <p:cNvPr id="27" name="TextBox 26">
               <a:extLst>
                 <a:ext uri="{FF2B5EF4-FFF2-40B4-BE49-F238E27FC236}">
@@ -5417,13 +5291,13 @@
             <p:nvPr>
               <p:extLst>
                 <p:ext uri="{D42A27DB-BD31-4B8C-83A1-F6EECF244321}">
-                  <p14:modId xmlns:p14="http://schemas.microsoft.com/office/powerpoint/2010/main" val="1596058130"/>
+                  <p14:modId xmlns:p14="http://schemas.microsoft.com/office/powerpoint/2010/main" val="2734840924"/>
                 </p:ext>
               </p:extLst>
             </p:nvPr>
           </p:nvGraphicFramePr>
           <p:xfrm>
-            <a:off x="2610888" y="4126262"/>
+            <a:off x="2741059" y="4186725"/>
             <a:ext cx="1948336" cy="1527841"/>
           </p:xfrm>
           <a:graphic>
@@ -6162,10 +6036,10 @@
         </p:nvGrpSpPr>
         <p:grpSpPr>
           <a:xfrm>
-            <a:off x="12367035" y="494906"/>
-            <a:ext cx="2957373" cy="3656869"/>
-            <a:chOff x="2610888" y="2604712"/>
-            <a:chExt cx="2957373" cy="3656869"/>
+            <a:off x="12136957" y="494906"/>
+            <a:ext cx="3167927" cy="3676215"/>
+            <a:chOff x="2380810" y="2604712"/>
+            <a:chExt cx="3167927" cy="3676215"/>
           </a:xfrm>
         </p:grpSpPr>
         <p:sp>
@@ -6226,9 +6100,9 @@
             <p:nvPr/>
           </p:nvSpPr>
           <p:spPr>
-            <a:xfrm rot="5400000">
-              <a:off x="5187227" y="4958163"/>
-              <a:ext cx="423514" cy="338554"/>
+            <a:xfrm rot="16200000">
+              <a:off x="2032426" y="5392093"/>
+              <a:ext cx="1035321" cy="338554"/>
             </a:xfrm>
             <a:prstGeom prst="rect">
               <a:avLst/>
@@ -6236,11 +6110,12 @@
             <a:noFill/>
           </p:spPr>
           <p:txBody>
-            <a:bodyPr wrap="none" rtlCol="0">
+            <a:bodyPr wrap="square" rtlCol="0">
               <a:spAutoFit/>
             </a:bodyPr>
             <a:lstStyle/>
             <a:p>
+              <a:pPr algn="ctr"/>
               <a:r>
                 <a:rPr lang="en-AU" sz="1600" b="1" dirty="0">
                   <a:latin typeface="Helvetica" pitchFamily="2" charset="0"/>
@@ -6308,13 +6183,13 @@
             <p:nvPr>
               <p:extLst>
                 <p:ext uri="{D42A27DB-BD31-4B8C-83A1-F6EECF244321}">
-                  <p14:modId xmlns:p14="http://schemas.microsoft.com/office/powerpoint/2010/main" val="4170775368"/>
+                  <p14:modId xmlns:p14="http://schemas.microsoft.com/office/powerpoint/2010/main" val="3121795641"/>
                 </p:ext>
               </p:extLst>
             </p:nvPr>
           </p:nvGraphicFramePr>
           <p:xfrm>
-            <a:off x="2610888" y="4126262"/>
+            <a:off x="2719363" y="4145608"/>
             <a:ext cx="2607001" cy="2135319"/>
           </p:xfrm>
           <a:graphic>
@@ -7460,6 +7335,135 @@
           </p:sp>
         </mc:Fallback>
       </mc:AlternateContent>
+      <p:sp>
+        <p:nvSpPr>
+          <p:cNvPr id="2" name="TextBox 1">
+            <a:extLst>
+              <a:ext uri="{FF2B5EF4-FFF2-40B4-BE49-F238E27FC236}">
+                <a16:creationId xmlns:a16="http://schemas.microsoft.com/office/drawing/2014/main" id="{06619CBB-057F-8132-427E-5251D4946E0F}"/>
+              </a:ext>
+            </a:extLst>
+          </p:cNvPr>
+          <p:cNvSpPr txBox="1">
+            <a:spLocks/>
+          </p:cNvSpPr>
+          <p:nvPr/>
+        </p:nvSpPr>
+        <p:spPr>
+          <a:xfrm rot="16200000">
+            <a:off x="7985855" y="2764625"/>
+            <a:ext cx="1035321" cy="338554"/>
+          </a:xfrm>
+          <a:prstGeom prst="rect">
+            <a:avLst/>
+          </a:prstGeom>
+          <a:noFill/>
+        </p:spPr>
+        <p:txBody>
+          <a:bodyPr wrap="square" rtlCol="0">
+            <a:spAutoFit/>
+          </a:bodyPr>
+          <a:lstStyle/>
+          <a:p>
+            <a:pPr algn="ctr"/>
+            <a:r>
+              <a:rPr lang="en-AU" sz="1600" b="1" dirty="0">
+                <a:latin typeface="Helvetica" pitchFamily="2" charset="0"/>
+              </a:rPr>
+              <a:t>F1</a:t>
+            </a:r>
+            <a:endParaRPr lang="en-US" sz="1600" b="1" dirty="0">
+              <a:latin typeface="Helvetica" pitchFamily="2" charset="0"/>
+            </a:endParaRPr>
+          </a:p>
+        </p:txBody>
+      </p:sp>
+      <p:sp>
+        <p:nvSpPr>
+          <p:cNvPr id="5" name="TextBox 4">
+            <a:extLst>
+              <a:ext uri="{FF2B5EF4-FFF2-40B4-BE49-F238E27FC236}">
+                <a16:creationId xmlns:a16="http://schemas.microsoft.com/office/drawing/2014/main" id="{28A3A31E-234E-9FAD-3ADD-078143B034FD}"/>
+              </a:ext>
+            </a:extLst>
+          </p:cNvPr>
+          <p:cNvSpPr txBox="1">
+            <a:spLocks/>
+          </p:cNvSpPr>
+          <p:nvPr/>
+        </p:nvSpPr>
+        <p:spPr>
+          <a:xfrm rot="16200000">
+            <a:off x="4238967" y="2764624"/>
+            <a:ext cx="1035321" cy="338554"/>
+          </a:xfrm>
+          <a:prstGeom prst="rect">
+            <a:avLst/>
+          </a:prstGeom>
+          <a:noFill/>
+        </p:spPr>
+        <p:txBody>
+          <a:bodyPr wrap="square" rtlCol="0">
+            <a:spAutoFit/>
+          </a:bodyPr>
+          <a:lstStyle/>
+          <a:p>
+            <a:pPr algn="ctr"/>
+            <a:r>
+              <a:rPr lang="en-AU" sz="1600" b="1" dirty="0">
+                <a:latin typeface="Helvetica" pitchFamily="2" charset="0"/>
+              </a:rPr>
+              <a:t>F1</a:t>
+            </a:r>
+            <a:endParaRPr lang="en-US" sz="1600" b="1" dirty="0">
+              <a:latin typeface="Helvetica" pitchFamily="2" charset="0"/>
+            </a:endParaRPr>
+          </a:p>
+        </p:txBody>
+      </p:sp>
+      <p:sp>
+        <p:nvSpPr>
+          <p:cNvPr id="7" name="TextBox 6">
+            <a:extLst>
+              <a:ext uri="{FF2B5EF4-FFF2-40B4-BE49-F238E27FC236}">
+                <a16:creationId xmlns:a16="http://schemas.microsoft.com/office/drawing/2014/main" id="{82C65DF5-9876-DB1C-9F16-D5F1D12FB875}"/>
+              </a:ext>
+            </a:extLst>
+          </p:cNvPr>
+          <p:cNvSpPr txBox="1">
+            <a:spLocks/>
+          </p:cNvSpPr>
+          <p:nvPr/>
+        </p:nvSpPr>
+        <p:spPr>
+          <a:xfrm rot="16200000">
+            <a:off x="533633" y="2764623"/>
+            <a:ext cx="1035321" cy="338554"/>
+          </a:xfrm>
+          <a:prstGeom prst="rect">
+            <a:avLst/>
+          </a:prstGeom>
+          <a:noFill/>
+        </p:spPr>
+        <p:txBody>
+          <a:bodyPr wrap="square" rtlCol="0">
+            <a:spAutoFit/>
+          </a:bodyPr>
+          <a:lstStyle/>
+          <a:p>
+            <a:pPr algn="ctr"/>
+            <a:r>
+              <a:rPr lang="en-AU" sz="1600" b="1" dirty="0">
+                <a:latin typeface="Helvetica" pitchFamily="2" charset="0"/>
+              </a:rPr>
+              <a:t>F1</a:t>
+            </a:r>
+            <a:endParaRPr lang="en-US" sz="1600" b="1" dirty="0">
+              <a:latin typeface="Helvetica" pitchFamily="2" charset="0"/>
+            </a:endParaRPr>
+          </a:p>
+        </p:txBody>
+      </p:sp>
     </p:spTree>
     <p:extLst>
       <p:ext uri="{BB962C8B-B14F-4D97-AF65-F5344CB8AC3E}">

</xml_diff>